<commit_message>
Added more analysis and explanation
</commit_message>
<xml_diff>
--- a/Mini_presentation.pptx
+++ b/Mini_presentation.pptx
@@ -8,6 +8,7 @@
     <p:sldId id="256" r:id="rId2"/>
     <p:sldId id="258" r:id="rId3"/>
     <p:sldId id="257" r:id="rId4"/>
+    <p:sldId id="259" r:id="rId5"/>
   </p:sldIdLst>
   <p:sldSz cx="12192000" cy="6858000"/>
   <p:notesSz cx="6858000" cy="9144000"/>
@@ -836,7 +837,7 @@
           <a:p>
             <a:fld id="{9DA34602-64CD-4804-BE1C-8026EE467431}" type="datetimeFigureOut">
               <a:rPr lang="en-IN" smtClean="0"/>
-              <a:t>14-01-2022</a:t>
+              <a:t>17-10-2022</a:t>
             </a:fld>
             <a:endParaRPr lang="en-IN"/>
           </a:p>
@@ -1087,7 +1088,7 @@
           <a:p>
             <a:fld id="{9DA34602-64CD-4804-BE1C-8026EE467431}" type="datetimeFigureOut">
               <a:rPr lang="en-IN" smtClean="0"/>
-              <a:t>14-01-2022</a:t>
+              <a:t>17-10-2022</a:t>
             </a:fld>
             <a:endParaRPr lang="en-IN"/>
           </a:p>
@@ -1401,7 +1402,7 @@
           <a:p>
             <a:fld id="{9DA34602-64CD-4804-BE1C-8026EE467431}" type="datetimeFigureOut">
               <a:rPr lang="en-IN" smtClean="0"/>
-              <a:t>14-01-2022</a:t>
+              <a:t>17-10-2022</a:t>
             </a:fld>
             <a:endParaRPr lang="en-IN"/>
           </a:p>
@@ -1742,7 +1743,7 @@
           <a:p>
             <a:fld id="{9DA34602-64CD-4804-BE1C-8026EE467431}" type="datetimeFigureOut">
               <a:rPr lang="en-IN" smtClean="0"/>
-              <a:t>14-01-2022</a:t>
+              <a:t>17-10-2022</a:t>
             </a:fld>
             <a:endParaRPr lang="en-IN"/>
           </a:p>
@@ -2056,7 +2057,7 @@
           <a:p>
             <a:fld id="{9DA34602-64CD-4804-BE1C-8026EE467431}" type="datetimeFigureOut">
               <a:rPr lang="en-IN" smtClean="0"/>
-              <a:t>14-01-2022</a:t>
+              <a:t>17-10-2022</a:t>
             </a:fld>
             <a:endParaRPr lang="en-IN"/>
           </a:p>
@@ -2449,7 +2450,7 @@
           <a:p>
             <a:fld id="{9DA34602-64CD-4804-BE1C-8026EE467431}" type="datetimeFigureOut">
               <a:rPr lang="en-IN" smtClean="0"/>
-              <a:t>14-01-2022</a:t>
+              <a:t>17-10-2022</a:t>
             </a:fld>
             <a:endParaRPr lang="en-IN"/>
           </a:p>
@@ -2619,7 +2620,7 @@
           <a:p>
             <a:fld id="{9DA34602-64CD-4804-BE1C-8026EE467431}" type="datetimeFigureOut">
               <a:rPr lang="en-IN" smtClean="0"/>
-              <a:t>14-01-2022</a:t>
+              <a:t>17-10-2022</a:t>
             </a:fld>
             <a:endParaRPr lang="en-IN"/>
           </a:p>
@@ -2799,7 +2800,7 @@
           <a:p>
             <a:fld id="{9DA34602-64CD-4804-BE1C-8026EE467431}" type="datetimeFigureOut">
               <a:rPr lang="en-IN" smtClean="0"/>
-              <a:t>14-01-2022</a:t>
+              <a:t>17-10-2022</a:t>
             </a:fld>
             <a:endParaRPr lang="en-IN"/>
           </a:p>
@@ -2975,7 +2976,7 @@
           <a:p>
             <a:fld id="{9DA34602-64CD-4804-BE1C-8026EE467431}" type="datetimeFigureOut">
               <a:rPr lang="en-IN" smtClean="0"/>
-              <a:t>14-01-2022</a:t>
+              <a:t>17-10-2022</a:t>
             </a:fld>
             <a:endParaRPr lang="en-IN"/>
           </a:p>
@@ -3222,7 +3223,7 @@
           <a:p>
             <a:fld id="{9DA34602-64CD-4804-BE1C-8026EE467431}" type="datetimeFigureOut">
               <a:rPr lang="en-IN" smtClean="0"/>
-              <a:t>14-01-2022</a:t>
+              <a:t>17-10-2022</a:t>
             </a:fld>
             <a:endParaRPr lang="en-IN"/>
           </a:p>
@@ -3454,7 +3455,7 @@
           <a:p>
             <a:fld id="{9DA34602-64CD-4804-BE1C-8026EE467431}" type="datetimeFigureOut">
               <a:rPr lang="en-IN" smtClean="0"/>
-              <a:t>14-01-2022</a:t>
+              <a:t>17-10-2022</a:t>
             </a:fld>
             <a:endParaRPr lang="en-IN"/>
           </a:p>
@@ -3828,7 +3829,7 @@
           <a:p>
             <a:fld id="{9DA34602-64CD-4804-BE1C-8026EE467431}" type="datetimeFigureOut">
               <a:rPr lang="en-IN" smtClean="0"/>
-              <a:t>14-01-2022</a:t>
+              <a:t>17-10-2022</a:t>
             </a:fld>
             <a:endParaRPr lang="en-IN"/>
           </a:p>
@@ -3951,7 +3952,7 @@
           <a:p>
             <a:fld id="{9DA34602-64CD-4804-BE1C-8026EE467431}" type="datetimeFigureOut">
               <a:rPr lang="en-IN" smtClean="0"/>
-              <a:t>14-01-2022</a:t>
+              <a:t>17-10-2022</a:t>
             </a:fld>
             <a:endParaRPr lang="en-IN"/>
           </a:p>
@@ -4046,7 +4047,7 @@
           <a:p>
             <a:fld id="{9DA34602-64CD-4804-BE1C-8026EE467431}" type="datetimeFigureOut">
               <a:rPr lang="en-IN" smtClean="0"/>
-              <a:t>14-01-2022</a:t>
+              <a:t>17-10-2022</a:t>
             </a:fld>
             <a:endParaRPr lang="en-IN"/>
           </a:p>
@@ -4301,7 +4302,7 @@
           <a:p>
             <a:fld id="{9DA34602-64CD-4804-BE1C-8026EE467431}" type="datetimeFigureOut">
               <a:rPr lang="en-IN" smtClean="0"/>
-              <a:t>14-01-2022</a:t>
+              <a:t>17-10-2022</a:t>
             </a:fld>
             <a:endParaRPr lang="en-IN"/>
           </a:p>
@@ -4564,7 +4565,7 @@
           <a:p>
             <a:fld id="{9DA34602-64CD-4804-BE1C-8026EE467431}" type="datetimeFigureOut">
               <a:rPr lang="en-IN" smtClean="0"/>
-              <a:t>14-01-2022</a:t>
+              <a:t>17-10-2022</a:t>
             </a:fld>
             <a:endParaRPr lang="en-IN"/>
           </a:p>
@@ -5307,7 +5308,7 @@
           <a:p>
             <a:fld id="{9DA34602-64CD-4804-BE1C-8026EE467431}" type="datetimeFigureOut">
               <a:rPr lang="en-IN" smtClean="0"/>
-              <a:t>14-01-2022</a:t>
+              <a:t>17-10-2022</a:t>
             </a:fld>
             <a:endParaRPr lang="en-IN"/>
           </a:p>
@@ -6097,14 +6098,14 @@
           <p:nvPr>
             <p:extLst>
               <p:ext uri="{D42A27DB-BD31-4B8C-83A1-F6EECF244321}">
-                <p14:modId xmlns:p14="http://schemas.microsoft.com/office/powerpoint/2010/main" val="1498329288"/>
+                <p14:modId xmlns:p14="http://schemas.microsoft.com/office/powerpoint/2010/main" val="3869239181"/>
               </p:ext>
             </p:extLst>
           </p:nvPr>
         </p:nvGraphicFramePr>
         <p:xfrm>
-          <a:off x="971971" y="2091267"/>
-          <a:ext cx="7766936" cy="3056465"/>
+          <a:off x="745727" y="1595121"/>
+          <a:ext cx="8435980" cy="3667758"/>
         </p:xfrm>
         <a:graphic>
           <a:graphicData uri="http://schemas.openxmlformats.org/drawingml/2006/table">
@@ -6113,14 +6114,14 @@
                 <a:tableStyleId>{5C22544A-7EE6-4342-B048-85BDC9FD1C3A}</a:tableStyleId>
               </a:tblPr>
               <a:tblGrid>
-                <a:gridCol w="3883468">
+                <a:gridCol w="3618883">
                   <a:extLst>
                     <a:ext uri="{9D8B030D-6E8A-4147-A177-3AD203B41FA5}">
                       <a16:colId xmlns:a16="http://schemas.microsoft.com/office/drawing/2014/main" val="3844553761"/>
                     </a:ext>
                   </a:extLst>
                 </a:gridCol>
-                <a:gridCol w="3883468">
+                <a:gridCol w="4817097">
                   <a:extLst>
                     <a:ext uri="{9D8B030D-6E8A-4147-A177-3AD203B41FA5}">
                       <a16:colId xmlns:a16="http://schemas.microsoft.com/office/drawing/2014/main" val="2454342109"/>
@@ -6150,7 +6151,7 @@
                     <a:p>
                       <a:r>
                         <a:rPr lang="en-US" sz="2400" dirty="0"/>
-                        <a:t>Accuracy</a:t>
+                        <a:t>Cross validation accuracy (%)</a:t>
                       </a:r>
                       <a:endParaRPr lang="en-IN" sz="2400" dirty="0"/>
                     </a:p>
@@ -6185,7 +6186,7 @@
                     <a:p>
                       <a:r>
                         <a:rPr lang="en-US" dirty="0"/>
-                        <a:t>0.84</a:t>
+                        <a:t>81.35</a:t>
                       </a:r>
                       <a:endParaRPr lang="en-IN" dirty="0"/>
                     </a:p>
@@ -6220,7 +6221,7 @@
                     <a:p>
                       <a:r>
                         <a:rPr lang="en-US" dirty="0"/>
-                        <a:t>0.74</a:t>
+                        <a:t>65.68</a:t>
                       </a:r>
                       <a:endParaRPr lang="en-IN" dirty="0"/>
                     </a:p>
@@ -6255,7 +6256,7 @@
                     <a:p>
                       <a:r>
                         <a:rPr lang="en-US" dirty="0"/>
-                        <a:t>0.79</a:t>
+                        <a:t>82.63</a:t>
                       </a:r>
                       <a:endParaRPr lang="en-IN" dirty="0"/>
                     </a:p>
@@ -6294,7 +6295,7 @@
                     <a:p>
                       <a:r>
                         <a:rPr lang="en-US" dirty="0"/>
-                        <a:t>0.75</a:t>
+                        <a:t>75.13</a:t>
                       </a:r>
                       <a:endParaRPr lang="en-IN" dirty="0"/>
                     </a:p>
@@ -6307,6 +6308,41 @@
                   </a:ext>
                 </a:extLst>
               </a:tr>
+              <a:tr h="611293">
+                <a:tc>
+                  <a:txBody>
+                    <a:bodyPr/>
+                    <a:lstStyle/>
+                    <a:p>
+                      <a:r>
+                        <a:rPr lang="en-US" dirty="0"/>
+                        <a:t>SGD Classifier</a:t>
+                      </a:r>
+                      <a:endParaRPr lang="en-IN" dirty="0"/>
+                    </a:p>
+                  </a:txBody>
+                  <a:tcPr/>
+                </a:tc>
+                <a:tc>
+                  <a:txBody>
+                    <a:bodyPr/>
+                    <a:lstStyle/>
+                    <a:p>
+                      <a:r>
+                        <a:rPr lang="en-US" dirty="0"/>
+                        <a:t>64.45</a:t>
+                      </a:r>
+                      <a:endParaRPr lang="en-IN" dirty="0"/>
+                    </a:p>
+                  </a:txBody>
+                  <a:tcPr/>
+                </a:tc>
+                <a:extLst>
+                  <a:ext uri="{0D108BD9-81ED-4DB2-BD59-A6C34878D82A}">
+                    <a16:rowId xmlns:a16="http://schemas.microsoft.com/office/drawing/2014/main" val="1859608193"/>
+                  </a:ext>
+                </a:extLst>
+              </a:tr>
             </a:tbl>
           </a:graphicData>
         </a:graphic>
@@ -6325,7 +6361,7 @@
         </p:nvSpPr>
         <p:spPr>
           <a:xfrm>
-            <a:off x="1707502" y="923731"/>
+            <a:off x="887370" y="556086"/>
             <a:ext cx="3139001" cy="707886"/>
           </a:xfrm>
           <a:prstGeom prst="rect">
@@ -6355,10 +6391,403 @@
           </a:p>
         </p:txBody>
       </p:sp>
+      <p:sp>
+        <p:nvSpPr>
+          <p:cNvPr id="2" name="TextBox 1">
+            <a:extLst>
+              <a:ext uri="{FF2B5EF4-FFF2-40B4-BE49-F238E27FC236}">
+                <a16:creationId xmlns:a16="http://schemas.microsoft.com/office/drawing/2014/main" id="{9C5C0BF3-A595-E065-34DB-7B263576ABD3}"/>
+              </a:ext>
+            </a:extLst>
+          </p:cNvPr>
+          <p:cNvSpPr txBox="1"/>
+          <p:nvPr/>
+        </p:nvSpPr>
+        <p:spPr>
+          <a:xfrm>
+            <a:off x="191104" y="5262879"/>
+            <a:ext cx="8990603" cy="1200329"/>
+          </a:xfrm>
+          <a:prstGeom prst="rect">
+            <a:avLst/>
+          </a:prstGeom>
+          <a:noFill/>
+        </p:spPr>
+        <p:txBody>
+          <a:bodyPr wrap="none" rtlCol="0">
+            <a:spAutoFit/>
+          </a:bodyPr>
+          <a:lstStyle/>
+          <a:p>
+            <a:r>
+              <a:rPr lang="en-US" dirty="0"/>
+              <a:t>From the table it can be observed that the best model is Random forest classifier.</a:t>
+            </a:r>
+          </a:p>
+          <a:p>
+            <a:r>
+              <a:rPr lang="en-US" dirty="0"/>
+              <a:t>The test accuracy obtained on using Random Forest Classifier is 84%. The accuracies </a:t>
+            </a:r>
+          </a:p>
+          <a:p>
+            <a:r>
+              <a:rPr lang="en-US" dirty="0"/>
+              <a:t>for classifying whether there is a heart disease or not are 85</a:t>
+            </a:r>
+            <a:r>
+              <a:rPr lang="en-US" sz="1800" dirty="0"/>
+              <a:t>% and 81% percent </a:t>
+            </a:r>
+          </a:p>
+          <a:p>
+            <a:r>
+              <a:rPr lang="en-US" dirty="0"/>
+              <a:t>respectively.</a:t>
+            </a:r>
+            <a:endParaRPr lang="en-IN" dirty="0"/>
+          </a:p>
+        </p:txBody>
+      </p:sp>
     </p:spTree>
     <p:extLst>
       <p:ext uri="{BB962C8B-B14F-4D97-AF65-F5344CB8AC3E}">
         <p14:creationId xmlns:p14="http://schemas.microsoft.com/office/powerpoint/2010/main" val="1267837615"/>
+      </p:ext>
+    </p:extLst>
+  </p:cSld>
+  <p:clrMapOvr>
+    <a:masterClrMapping/>
+  </p:clrMapOvr>
+</p:sld>
+</file>
+
+<file path=ppt/slides/slide4.xml><?xml version="1.0" encoding="utf-8"?>
+<p:sld xmlns:a="http://schemas.openxmlformats.org/drawingml/2006/main" xmlns:r="http://schemas.openxmlformats.org/officeDocument/2006/relationships" xmlns:p="http://schemas.openxmlformats.org/presentationml/2006/main">
+  <p:cSld>
+    <p:spTree>
+      <p:nvGrpSpPr>
+        <p:cNvPr id="1" name=""/>
+        <p:cNvGrpSpPr/>
+        <p:nvPr/>
+      </p:nvGrpSpPr>
+      <p:grpSpPr>
+        <a:xfrm>
+          <a:off x="0" y="0"/>
+          <a:ext cx="0" cy="0"/>
+          <a:chOff x="0" y="0"/>
+          <a:chExt cx="0" cy="0"/>
+        </a:xfrm>
+      </p:grpSpPr>
+      <p:sp>
+        <p:nvSpPr>
+          <p:cNvPr id="2" name="Title 1">
+            <a:extLst>
+              <a:ext uri="{FF2B5EF4-FFF2-40B4-BE49-F238E27FC236}">
+                <a16:creationId xmlns:a16="http://schemas.microsoft.com/office/drawing/2014/main" id="{6F5F6FEC-FBC6-5F8D-BB0A-00CC9AB724EC}"/>
+              </a:ext>
+            </a:extLst>
+          </p:cNvPr>
+          <p:cNvSpPr>
+            <a:spLocks noGrp="1"/>
+          </p:cNvSpPr>
+          <p:nvPr>
+            <p:ph type="title"/>
+          </p:nvPr>
+        </p:nvSpPr>
+        <p:spPr/>
+        <p:txBody>
+          <a:bodyPr/>
+          <a:lstStyle/>
+          <a:p>
+            <a:r>
+              <a:rPr lang="en-US" dirty="0"/>
+              <a:t>Most Important features</a:t>
+            </a:r>
+            <a:endParaRPr lang="en-IN" dirty="0"/>
+          </a:p>
+        </p:txBody>
+      </p:sp>
+      <p:graphicFrame>
+        <p:nvGraphicFramePr>
+          <p:cNvPr id="4" name="Table 4">
+            <a:extLst>
+              <a:ext uri="{FF2B5EF4-FFF2-40B4-BE49-F238E27FC236}">
+                <a16:creationId xmlns:a16="http://schemas.microsoft.com/office/drawing/2014/main" id="{B557C9CB-ED8C-D637-FB34-0E0E0E502FCF}"/>
+              </a:ext>
+            </a:extLst>
+          </p:cNvPr>
+          <p:cNvGraphicFramePr>
+            <a:graphicFrameLocks noGrp="1"/>
+          </p:cNvGraphicFramePr>
+          <p:nvPr>
+            <p:extLst>
+              <p:ext uri="{D42A27DB-BD31-4B8C-83A1-F6EECF244321}">
+                <p14:modId xmlns:p14="http://schemas.microsoft.com/office/powerpoint/2010/main" val="445163863"/>
+              </p:ext>
+            </p:extLst>
+          </p:nvPr>
+        </p:nvGraphicFramePr>
+        <p:xfrm>
+          <a:off x="789118" y="1461154"/>
+          <a:ext cx="7214238" cy="3684935"/>
+        </p:xfrm>
+        <a:graphic>
+          <a:graphicData uri="http://schemas.openxmlformats.org/drawingml/2006/table">
+            <a:tbl>
+              <a:tblPr firstRow="1" bandRow="1">
+                <a:tableStyleId>{5C22544A-7EE6-4342-B048-85BDC9FD1C3A}</a:tableStyleId>
+              </a:tblPr>
+              <a:tblGrid>
+                <a:gridCol w="3607119">
+                  <a:extLst>
+                    <a:ext uri="{9D8B030D-6E8A-4147-A177-3AD203B41FA5}">
+                      <a16:colId xmlns:a16="http://schemas.microsoft.com/office/drawing/2014/main" val="3790886544"/>
+                    </a:ext>
+                  </a:extLst>
+                </a:gridCol>
+                <a:gridCol w="3607119">
+                  <a:extLst>
+                    <a:ext uri="{9D8B030D-6E8A-4147-A177-3AD203B41FA5}">
+                      <a16:colId xmlns:a16="http://schemas.microsoft.com/office/drawing/2014/main" val="1528346101"/>
+                    </a:ext>
+                  </a:extLst>
+                </a:gridCol>
+              </a:tblGrid>
+              <a:tr h="608971">
+                <a:tc>
+                  <a:txBody>
+                    <a:bodyPr/>
+                    <a:lstStyle/>
+                    <a:p>
+                      <a:r>
+                        <a:rPr lang="en-US" dirty="0"/>
+                        <a:t>Feature name</a:t>
+                      </a:r>
+                      <a:endParaRPr lang="en-IN" dirty="0"/>
+                    </a:p>
+                  </a:txBody>
+                  <a:tcPr/>
+                </a:tc>
+                <a:tc>
+                  <a:txBody>
+                    <a:bodyPr/>
+                    <a:lstStyle/>
+                    <a:p>
+                      <a:r>
+                        <a:rPr lang="en-US" dirty="0"/>
+                        <a:t>Importance (%)</a:t>
+                      </a:r>
+                      <a:endParaRPr lang="en-IN" dirty="0"/>
+                    </a:p>
+                  </a:txBody>
+                  <a:tcPr/>
+                </a:tc>
+                <a:extLst>
+                  <a:ext uri="{0D108BD9-81ED-4DB2-BD59-A6C34878D82A}">
+                    <a16:rowId xmlns:a16="http://schemas.microsoft.com/office/drawing/2014/main" val="525925597"/>
+                  </a:ext>
+                </a:extLst>
+              </a:tr>
+              <a:tr h="608971">
+                <a:tc>
+                  <a:txBody>
+                    <a:bodyPr/>
+                    <a:lstStyle/>
+                    <a:p>
+                      <a:r>
+                        <a:rPr lang="en-US" dirty="0"/>
+                        <a:t>The number of major vessels</a:t>
+                      </a:r>
+                      <a:endParaRPr lang="en-IN" dirty="0"/>
+                    </a:p>
+                  </a:txBody>
+                  <a:tcPr/>
+                </a:tc>
+                <a:tc>
+                  <a:txBody>
+                    <a:bodyPr/>
+                    <a:lstStyle/>
+                    <a:p>
+                      <a:r>
+                        <a:rPr lang="en-US" dirty="0"/>
+                        <a:t>18.14</a:t>
+                      </a:r>
+                      <a:endParaRPr lang="en-IN" dirty="0"/>
+                    </a:p>
+                  </a:txBody>
+                  <a:tcPr/>
+                </a:tc>
+                <a:extLst>
+                  <a:ext uri="{0D108BD9-81ED-4DB2-BD59-A6C34878D82A}">
+                    <a16:rowId xmlns:a16="http://schemas.microsoft.com/office/drawing/2014/main" val="1554853205"/>
+                  </a:ext>
+                </a:extLst>
+              </a:tr>
+              <a:tr h="608971">
+                <a:tc>
+                  <a:txBody>
+                    <a:bodyPr/>
+                    <a:lstStyle/>
+                    <a:p>
+                      <a:r>
+                        <a:rPr lang="en-US" dirty="0"/>
+                        <a:t>Chest pain experienced</a:t>
+                      </a:r>
+                      <a:endParaRPr lang="en-IN" dirty="0"/>
+                    </a:p>
+                  </a:txBody>
+                  <a:tcPr/>
+                </a:tc>
+                <a:tc>
+                  <a:txBody>
+                    <a:bodyPr/>
+                    <a:lstStyle/>
+                    <a:p>
+                      <a:r>
+                        <a:rPr lang="en-US" dirty="0"/>
+                        <a:t>18.13</a:t>
+                      </a:r>
+                      <a:endParaRPr lang="en-IN" dirty="0"/>
+                    </a:p>
+                  </a:txBody>
+                  <a:tcPr/>
+                </a:tc>
+                <a:extLst>
+                  <a:ext uri="{0D108BD9-81ED-4DB2-BD59-A6C34878D82A}">
+                    <a16:rowId xmlns:a16="http://schemas.microsoft.com/office/drawing/2014/main" val="1777533453"/>
+                  </a:ext>
+                </a:extLst>
+              </a:tr>
+              <a:tr h="608971">
+                <a:tc>
+                  <a:txBody>
+                    <a:bodyPr/>
+                    <a:lstStyle/>
+                    <a:p>
+                      <a:r>
+                        <a:rPr lang="en-IN" sz="1800" b="0" i="0" kern="1200" dirty="0">
+                          <a:solidFill>
+                            <a:schemeClr val="dk1"/>
+                          </a:solidFill>
+                          <a:effectLst/>
+                          <a:latin typeface="+mn-lt"/>
+                          <a:ea typeface="+mn-ea"/>
+                          <a:cs typeface="+mn-cs"/>
+                        </a:rPr>
+                        <a:t>Depression induced by exercise relative to rest</a:t>
+                      </a:r>
+                      <a:endParaRPr lang="en-IN" dirty="0"/>
+                    </a:p>
+                  </a:txBody>
+                  <a:tcPr/>
+                </a:tc>
+                <a:tc>
+                  <a:txBody>
+                    <a:bodyPr/>
+                    <a:lstStyle/>
+                    <a:p>
+                      <a:r>
+                        <a:rPr lang="en-US" dirty="0"/>
+                        <a:t>15.33</a:t>
+                      </a:r>
+                      <a:endParaRPr lang="en-IN" dirty="0"/>
+                    </a:p>
+                  </a:txBody>
+                  <a:tcPr/>
+                </a:tc>
+                <a:extLst>
+                  <a:ext uri="{0D108BD9-81ED-4DB2-BD59-A6C34878D82A}">
+                    <a16:rowId xmlns:a16="http://schemas.microsoft.com/office/drawing/2014/main" val="1335201652"/>
+                  </a:ext>
+                </a:extLst>
+              </a:tr>
+              <a:tr h="608971">
+                <a:tc>
+                  <a:txBody>
+                    <a:bodyPr/>
+                    <a:lstStyle/>
+                    <a:p>
+                      <a:r>
+                        <a:rPr lang="en-IN" sz="1800" b="0" i="0" kern="1200" dirty="0">
+                          <a:solidFill>
+                            <a:schemeClr val="dk1"/>
+                          </a:solidFill>
+                          <a:effectLst/>
+                          <a:latin typeface="+mn-lt"/>
+                          <a:ea typeface="+mn-ea"/>
+                          <a:cs typeface="+mn-cs"/>
+                        </a:rPr>
+                        <a:t>Thalassemia</a:t>
+                      </a:r>
+                      <a:endParaRPr lang="en-IN" dirty="0"/>
+                    </a:p>
+                  </a:txBody>
+                  <a:tcPr/>
+                </a:tc>
+                <a:tc>
+                  <a:txBody>
+                    <a:bodyPr/>
+                    <a:lstStyle/>
+                    <a:p>
+                      <a:r>
+                        <a:rPr lang="en-US" dirty="0"/>
+                        <a:t>13.24</a:t>
+                      </a:r>
+                      <a:endParaRPr lang="en-IN" dirty="0"/>
+                    </a:p>
+                  </a:txBody>
+                  <a:tcPr/>
+                </a:tc>
+                <a:extLst>
+                  <a:ext uri="{0D108BD9-81ED-4DB2-BD59-A6C34878D82A}">
+                    <a16:rowId xmlns:a16="http://schemas.microsoft.com/office/drawing/2014/main" val="4079083241"/>
+                  </a:ext>
+                </a:extLst>
+              </a:tr>
+              <a:tr h="608971">
+                <a:tc>
+                  <a:txBody>
+                    <a:bodyPr/>
+                    <a:lstStyle/>
+                    <a:p>
+                      <a:r>
+                        <a:rPr lang="en-US" dirty="0"/>
+                        <a:t>Maximum heart rate achieved</a:t>
+                      </a:r>
+                      <a:endParaRPr lang="en-IN" dirty="0"/>
+                    </a:p>
+                  </a:txBody>
+                  <a:tcPr/>
+                </a:tc>
+                <a:tc>
+                  <a:txBody>
+                    <a:bodyPr/>
+                    <a:lstStyle/>
+                    <a:p>
+                      <a:r>
+                        <a:rPr lang="en-US" dirty="0"/>
+                        <a:t>12.59</a:t>
+                      </a:r>
+                      <a:endParaRPr lang="en-IN" dirty="0"/>
+                    </a:p>
+                  </a:txBody>
+                  <a:tcPr/>
+                </a:tc>
+                <a:extLst>
+                  <a:ext uri="{0D108BD9-81ED-4DB2-BD59-A6C34878D82A}">
+                    <a16:rowId xmlns:a16="http://schemas.microsoft.com/office/drawing/2014/main" val="532098487"/>
+                  </a:ext>
+                </a:extLst>
+              </a:tr>
+            </a:tbl>
+          </a:graphicData>
+        </a:graphic>
+      </p:graphicFrame>
+    </p:spTree>
+    <p:extLst>
+      <p:ext uri="{BB962C8B-B14F-4D97-AF65-F5344CB8AC3E}">
+        <p14:creationId xmlns:p14="http://schemas.microsoft.com/office/powerpoint/2010/main" val="3396880319"/>
       </p:ext>
     </p:extLst>
   </p:cSld>

</xml_diff>